<commit_message>
Adding the RDT icon
</commit_message>
<xml_diff>
--- a/icons/NHERI Application Icons.pptx
+++ b/icons/NHERI Application Icons.pptx
@@ -16,7 +16,8 @@
     <p:sldId id="265" r:id="rId10"/>
     <p:sldId id="266" r:id="rId11"/>
     <p:sldId id="267" r:id="rId12"/>
-    <p:sldId id="264" r:id="rId13"/>
+    <p:sldId id="268" r:id="rId13"/>
+    <p:sldId id="264" r:id="rId14"/>
   </p:sldIdLst>
   <p:sldSz cx="12192000" cy="6858000"/>
   <p:notesSz cx="6858000" cy="9144000"/>
@@ -3608,6 +3609,90 @@
           <a:chExt cx="0" cy="0"/>
         </a:xfrm>
       </p:grpSpPr>
+      <p:sp>
+        <p:nvSpPr>
+          <p:cNvPr id="2" name="Title 1">
+            <a:extLst>
+              <a:ext uri="{FF2B5EF4-FFF2-40B4-BE49-F238E27FC236}">
+                <a16:creationId xmlns:a16="http://schemas.microsoft.com/office/drawing/2014/main" id="{0FD4DB59-350F-D54A-9CBC-D5A9A3A5F0F8}"/>
+              </a:ext>
+            </a:extLst>
+          </p:cNvPr>
+          <p:cNvSpPr>
+            <a:spLocks noGrp="1"/>
+          </p:cNvSpPr>
+          <p:nvPr>
+            <p:ph type="title"/>
+          </p:nvPr>
+        </p:nvSpPr>
+        <p:spPr/>
+        <p:txBody>
+          <a:bodyPr/>
+          <a:lstStyle/>
+          <a:p>
+            <a:endParaRPr lang="en-US"/>
+          </a:p>
+        </p:txBody>
+      </p:sp>
+      <p:pic>
+        <p:nvPicPr>
+          <p:cNvPr id="5" name="Content Placeholder 4">
+            <a:extLst>
+              <a:ext uri="{FF2B5EF4-FFF2-40B4-BE49-F238E27FC236}">
+                <a16:creationId xmlns:a16="http://schemas.microsoft.com/office/drawing/2014/main" id="{C8F8B6D2-3A38-1641-A917-CCEAA243CE3D}"/>
+              </a:ext>
+            </a:extLst>
+          </p:cNvPr>
+          <p:cNvPicPr>
+            <a:picLocks noGrp="1" noChangeAspect="1"/>
+          </p:cNvPicPr>
+          <p:nvPr>
+            <p:ph idx="1"/>
+          </p:nvPr>
+        </p:nvPicPr>
+        <p:blipFill>
+          <a:blip r:embed="rId2"/>
+          <a:stretch>
+            <a:fillRect/>
+          </a:stretch>
+        </p:blipFill>
+        <p:spPr>
+          <a:xfrm>
+            <a:off x="3920331" y="1825625"/>
+            <a:ext cx="4351338" cy="4351338"/>
+          </a:xfrm>
+        </p:spPr>
+      </p:pic>
+    </p:spTree>
+    <p:extLst>
+      <p:ext uri="{BB962C8B-B14F-4D97-AF65-F5344CB8AC3E}">
+        <p14:creationId xmlns:p14="http://schemas.microsoft.com/office/powerpoint/2010/main" val="2178503888"/>
+      </p:ext>
+    </p:extLst>
+  </p:cSld>
+  <p:clrMapOvr>
+    <a:masterClrMapping/>
+  </p:clrMapOvr>
+</p:sld>
+</file>
+
+<file path=ppt/slides/slide13.xml><?xml version="1.0" encoding="utf-8"?>
+<p:sld xmlns:a="http://schemas.openxmlformats.org/drawingml/2006/main" xmlns:r="http://schemas.openxmlformats.org/officeDocument/2006/relationships" xmlns:p="http://schemas.openxmlformats.org/presentationml/2006/main">
+  <p:cSld>
+    <p:spTree>
+      <p:nvGrpSpPr>
+        <p:cNvPr id="1" name=""/>
+        <p:cNvGrpSpPr/>
+        <p:nvPr/>
+      </p:nvGrpSpPr>
+      <p:grpSpPr>
+        <a:xfrm>
+          <a:off x="0" y="0"/>
+          <a:ext cx="0" cy="0"/>
+          <a:chOff x="0" y="0"/>
+          <a:chExt cx="0" cy="0"/>
+        </a:xfrm>
+      </p:grpSpPr>
       <p:pic>
         <p:nvPicPr>
           <p:cNvPr id="11" name="Picture 10">
@@ -3630,7 +3715,7 @@
         </p:blipFill>
         <p:spPr>
           <a:xfrm>
-            <a:off x="8165834" y="4241800"/>
+            <a:off x="7847336" y="4241800"/>
             <a:ext cx="1625600" cy="1625600"/>
           </a:xfrm>
           <a:prstGeom prst="rect">
@@ -3662,7 +3747,7 @@
         </p:blipFill>
         <p:spPr>
           <a:xfrm>
-            <a:off x="5766574" y="4241800"/>
+            <a:off x="5554242" y="4241800"/>
             <a:ext cx="1625600" cy="1625600"/>
           </a:xfrm>
         </p:spPr>
@@ -3689,7 +3774,7 @@
         </p:blipFill>
         <p:spPr>
           <a:xfrm>
-            <a:off x="3367314" y="4241800"/>
+            <a:off x="3261148" y="4241800"/>
             <a:ext cx="1625600" cy="1625600"/>
           </a:xfrm>
           <a:prstGeom prst="rect">
@@ -3749,7 +3834,7 @@
         </p:blipFill>
         <p:spPr>
           <a:xfrm>
-            <a:off x="6966204" y="1903083"/>
+            <a:off x="6700789" y="1903083"/>
             <a:ext cx="1625600" cy="1625600"/>
           </a:xfrm>
           <a:prstGeom prst="rect">
@@ -3779,7 +3864,7 @@
         </p:blipFill>
         <p:spPr>
           <a:xfrm>
-            <a:off x="2167684" y="1903083"/>
+            <a:off x="2114601" y="1903083"/>
             <a:ext cx="1625600" cy="1625600"/>
           </a:xfrm>
           <a:prstGeom prst="rect">
@@ -3837,7 +3922,7 @@
         </p:blipFill>
         <p:spPr>
           <a:xfrm>
-            <a:off x="9365462" y="1903083"/>
+            <a:off x="8993883" y="1903083"/>
             <a:ext cx="1625600" cy="1625600"/>
           </a:xfrm>
           <a:prstGeom prst="rect">
@@ -3867,7 +3952,37 @@
         </p:blipFill>
         <p:spPr>
           <a:xfrm>
-            <a:off x="4566944" y="1903083"/>
+            <a:off x="4407695" y="1903083"/>
+            <a:ext cx="1625600" cy="1625600"/>
+          </a:xfrm>
+          <a:prstGeom prst="rect">
+            <a:avLst/>
+          </a:prstGeom>
+        </p:spPr>
+      </p:pic>
+      <p:pic>
+        <p:nvPicPr>
+          <p:cNvPr id="10" name="Picture 9">
+            <a:extLst>
+              <a:ext uri="{FF2B5EF4-FFF2-40B4-BE49-F238E27FC236}">
+                <a16:creationId xmlns:a16="http://schemas.microsoft.com/office/drawing/2014/main" id="{6E7D3142-5479-1343-866F-DF96E130193F}"/>
+              </a:ext>
+            </a:extLst>
+          </p:cNvPr>
+          <p:cNvPicPr>
+            <a:picLocks noChangeAspect="1"/>
+          </p:cNvPicPr>
+          <p:nvPr/>
+        </p:nvPicPr>
+        <p:blipFill>
+          <a:blip r:embed="rId10"/>
+          <a:stretch>
+            <a:fillRect/>
+          </a:stretch>
+        </p:blipFill>
+        <p:spPr>
+          <a:xfrm>
+            <a:off x="10140430" y="4241800"/>
             <a:ext cx="1625600" cy="1625600"/>
           </a:xfrm>
           <a:prstGeom prst="rect">

</xml_diff>